<commit_message>
Improved upon initial slides, included more links, added a Who? slide
</commit_message>
<xml_diff>
--- a/doc/IntroToVStar.pptx
+++ b/doc/IntroToVStar.pptx
@@ -9,9 +9,9 @@
   </p:notesMasterIdLst>
   <p:sldIdLst>
     <p:sldId id="260" r:id="rId2"/>
-    <p:sldId id="258" r:id="rId3"/>
-    <p:sldId id="257" r:id="rId4"/>
-    <p:sldId id="261" r:id="rId5"/>
+    <p:sldId id="257" r:id="rId3"/>
+    <p:sldId id="261" r:id="rId4"/>
+    <p:sldId id="262" r:id="rId5"/>
     <p:sldId id="259" r:id="rId6"/>
   </p:sldIdLst>
   <p:sldSz cx="9144000" cy="6858000" type="screen4x3"/>
@@ -196,7 +196,8 @@
           <a:p>
             <a:fld id="{CCCFB0D0-E02B-4E40-A593-C48437288564}" type="datetimeFigureOut">
               <a:rPr lang="en-US" smtClean="0"/>
-              <a:t>8/7/09</a:t>
+              <a:pPr/>
+              <a:t>8/16/09</a:t>
             </a:fld>
             <a:endParaRPr lang="en-US"/>
           </a:p>
@@ -357,6 +358,7 @@
           <a:p>
             <a:fld id="{5D8D55B8-A69F-8E42-9ED1-65F5D52CBA27}" type="slidenum">
               <a:rPr lang="en-US" smtClean="0"/>
+              <a:pPr/>
               <a:t>‹#›</a:t>
             </a:fld>
             <a:endParaRPr lang="en-US"/>
@@ -507,10 +509,6 @@
           </a:bodyPr>
           <a:lstStyle/>
           <a:p>
-            <a:r>
-              <a:rPr lang="en-US" dirty="0" smtClean="0"/>
-              <a:t/>
-            </a:r>
             <a:endParaRPr lang="en-US" dirty="0"/>
           </a:p>
         </p:txBody>
@@ -532,6 +530,7 @@
           <a:p>
             <a:fld id="{5D8D55B8-A69F-8E42-9ED1-65F5D52CBA27}" type="slidenum">
               <a:rPr lang="en-US" smtClean="0"/>
+              <a:pPr/>
               <a:t>1</a:t>
             </a:fld>
             <a:endParaRPr lang="en-US"/>
@@ -657,7 +656,8 @@
           <a:p>
             <a:fld id="{E73F8FE4-34DD-454E-8C0A-8D6C626BB0E4}" type="datetimeFigureOut">
               <a:rPr lang="en-US" smtClean="0"/>
-              <a:t>8/5/09</a:t>
+              <a:pPr/>
+              <a:t>8/16/09</a:t>
             </a:fld>
             <a:endParaRPr lang="en-US"/>
           </a:p>
@@ -699,6 +699,7 @@
           <a:p>
             <a:fld id="{1FB45B1B-E18E-D548-AA7A-0FD177A138E9}" type="slidenum">
               <a:rPr lang="en-US" smtClean="0"/>
+              <a:pPr/>
               <a:t>‹#›</a:t>
             </a:fld>
             <a:endParaRPr lang="en-US"/>
@@ -883,7 +884,8 @@
           <a:p>
             <a:fld id="{E73F8FE4-34DD-454E-8C0A-8D6C626BB0E4}" type="datetimeFigureOut">
               <a:rPr lang="en-US" smtClean="0"/>
-              <a:t>8/5/09</a:t>
+              <a:pPr/>
+              <a:t>8/16/09</a:t>
             </a:fld>
             <a:endParaRPr lang="en-US"/>
           </a:p>
@@ -925,6 +927,7 @@
           <a:p>
             <a:fld id="{1FB45B1B-E18E-D548-AA7A-0FD177A138E9}" type="slidenum">
               <a:rPr lang="en-US" smtClean="0"/>
+              <a:pPr/>
               <a:t>‹#›</a:t>
             </a:fld>
             <a:endParaRPr lang="en-US"/>
@@ -1058,7 +1061,8 @@
           <a:p>
             <a:fld id="{E73F8FE4-34DD-454E-8C0A-8D6C626BB0E4}" type="datetimeFigureOut">
               <a:rPr lang="en-US" smtClean="0"/>
-              <a:t>8/5/09</a:t>
+              <a:pPr/>
+              <a:t>8/16/09</a:t>
             </a:fld>
             <a:endParaRPr lang="en-US"/>
           </a:p>
@@ -1100,6 +1104,7 @@
           <a:p>
             <a:fld id="{1FB45B1B-E18E-D548-AA7A-0FD177A138E9}" type="slidenum">
               <a:rPr lang="en-US" smtClean="0"/>
+              <a:pPr/>
               <a:t>‹#›</a:t>
             </a:fld>
             <a:endParaRPr lang="en-US"/>
@@ -1223,7 +1228,8 @@
           <a:p>
             <a:fld id="{E73F8FE4-34DD-454E-8C0A-8D6C626BB0E4}" type="datetimeFigureOut">
               <a:rPr lang="en-US" smtClean="0"/>
-              <a:t>8/5/09</a:t>
+              <a:pPr/>
+              <a:t>8/16/09</a:t>
             </a:fld>
             <a:endParaRPr lang="en-US"/>
           </a:p>
@@ -1265,6 +1271,7 @@
           <a:p>
             <a:fld id="{1FB45B1B-E18E-D548-AA7A-0FD177A138E9}" type="slidenum">
               <a:rPr lang="en-US" smtClean="0"/>
+              <a:pPr/>
               <a:t>‹#›</a:t>
             </a:fld>
             <a:endParaRPr lang="en-US"/>
@@ -1467,7 +1474,8 @@
           <a:p>
             <a:fld id="{E73F8FE4-34DD-454E-8C0A-8D6C626BB0E4}" type="datetimeFigureOut">
               <a:rPr lang="en-US" smtClean="0"/>
-              <a:t>8/5/09</a:t>
+              <a:pPr/>
+              <a:t>8/16/09</a:t>
             </a:fld>
             <a:endParaRPr lang="en-US"/>
           </a:p>
@@ -1514,6 +1522,7 @@
           <a:p>
             <a:fld id="{1FB45B1B-E18E-D548-AA7A-0FD177A138E9}" type="slidenum">
               <a:rPr lang="en-US" smtClean="0"/>
+              <a:pPr/>
               <a:t>‹#›</a:t>
             </a:fld>
             <a:endParaRPr lang="en-US"/>
@@ -1731,7 +1740,8 @@
           <a:p>
             <a:fld id="{E73F8FE4-34DD-454E-8C0A-8D6C626BB0E4}" type="datetimeFigureOut">
               <a:rPr lang="en-US" smtClean="0"/>
-              <a:t>8/5/09</a:t>
+              <a:pPr/>
+              <a:t>8/16/09</a:t>
             </a:fld>
             <a:endParaRPr lang="en-US"/>
           </a:p>
@@ -1773,6 +1783,7 @@
           <a:p>
             <a:fld id="{1FB45B1B-E18E-D548-AA7A-0FD177A138E9}" type="slidenum">
               <a:rPr lang="en-US" smtClean="0"/>
+              <a:pPr/>
               <a:t>‹#›</a:t>
             </a:fld>
             <a:endParaRPr lang="en-US"/>
@@ -2105,7 +2116,8 @@
           <a:p>
             <a:fld id="{E73F8FE4-34DD-454E-8C0A-8D6C626BB0E4}" type="datetimeFigureOut">
               <a:rPr lang="en-US" smtClean="0"/>
-              <a:t>8/5/09</a:t>
+              <a:pPr/>
+              <a:t>8/16/09</a:t>
             </a:fld>
             <a:endParaRPr lang="en-US"/>
           </a:p>
@@ -2147,6 +2159,7 @@
           <a:p>
             <a:fld id="{1FB45B1B-E18E-D548-AA7A-0FD177A138E9}" type="slidenum">
               <a:rPr lang="en-US" smtClean="0"/>
+              <a:pPr/>
               <a:t>‹#›</a:t>
             </a:fld>
             <a:endParaRPr lang="en-US"/>
@@ -2218,7 +2231,8 @@
           <a:p>
             <a:fld id="{E73F8FE4-34DD-454E-8C0A-8D6C626BB0E4}" type="datetimeFigureOut">
               <a:rPr lang="en-US" smtClean="0"/>
-              <a:t>8/5/09</a:t>
+              <a:pPr/>
+              <a:t>8/16/09</a:t>
             </a:fld>
             <a:endParaRPr lang="en-US"/>
           </a:p>
@@ -2260,6 +2274,7 @@
           <a:p>
             <a:fld id="{1FB45B1B-E18E-D548-AA7A-0FD177A138E9}" type="slidenum">
               <a:rPr lang="en-US" smtClean="0"/>
+              <a:pPr/>
               <a:t>‹#›</a:t>
             </a:fld>
             <a:endParaRPr lang="en-US"/>
@@ -2308,7 +2323,8 @@
           <a:p>
             <a:fld id="{E73F8FE4-34DD-454E-8C0A-8D6C626BB0E4}" type="datetimeFigureOut">
               <a:rPr lang="en-US" smtClean="0"/>
-              <a:t>8/5/09</a:t>
+              <a:pPr/>
+              <a:t>8/16/09</a:t>
             </a:fld>
             <a:endParaRPr lang="en-US"/>
           </a:p>
@@ -2350,6 +2366,7 @@
           <a:p>
             <a:fld id="{1FB45B1B-E18E-D548-AA7A-0FD177A138E9}" type="slidenum">
               <a:rPr lang="en-US" smtClean="0"/>
+              <a:pPr/>
               <a:t>‹#›</a:t>
             </a:fld>
             <a:endParaRPr lang="en-US"/>
@@ -2566,7 +2583,8 @@
           <a:p>
             <a:fld id="{E73F8FE4-34DD-454E-8C0A-8D6C626BB0E4}" type="datetimeFigureOut">
               <a:rPr lang="en-US" smtClean="0"/>
-              <a:t>8/5/09</a:t>
+              <a:pPr/>
+              <a:t>8/16/09</a:t>
             </a:fld>
             <a:endParaRPr lang="en-US"/>
           </a:p>
@@ -2608,6 +2626,7 @@
           <a:p>
             <a:fld id="{1FB45B1B-E18E-D548-AA7A-0FD177A138E9}" type="slidenum">
               <a:rPr lang="en-US" smtClean="0"/>
+              <a:pPr/>
               <a:t>‹#›</a:t>
             </a:fld>
             <a:endParaRPr lang="en-US"/>
@@ -2830,7 +2849,8 @@
           <a:p>
             <a:fld id="{E73F8FE4-34DD-454E-8C0A-8D6C626BB0E4}" type="datetimeFigureOut">
               <a:rPr lang="en-US" smtClean="0"/>
-              <a:t>8/5/09</a:t>
+              <a:pPr/>
+              <a:t>8/16/09</a:t>
             </a:fld>
             <a:endParaRPr lang="en-US"/>
           </a:p>
@@ -2872,6 +2892,7 @@
           <a:p>
             <a:fld id="{1FB45B1B-E18E-D548-AA7A-0FD177A138E9}" type="slidenum">
               <a:rPr lang="en-US" smtClean="0"/>
+              <a:pPr/>
               <a:t>‹#›</a:t>
             </a:fld>
             <a:endParaRPr lang="en-US"/>
@@ -3047,7 +3068,8 @@
           <a:p>
             <a:fld id="{E73F8FE4-34DD-454E-8C0A-8D6C626BB0E4}" type="datetimeFigureOut">
               <a:rPr lang="en-US" smtClean="0"/>
-              <a:t>8/5/09</a:t>
+              <a:pPr/>
+              <a:t>8/16/09</a:t>
             </a:fld>
             <a:endParaRPr lang="en-US"/>
           </a:p>
@@ -3125,6 +3147,7 @@
           <a:p>
             <a:fld id="{1FB45B1B-E18E-D548-AA7A-0FD177A138E9}" type="slidenum">
               <a:rPr lang="en-US" smtClean="0"/>
+              <a:pPr/>
               <a:t>‹#›</a:t>
             </a:fld>
             <a:endParaRPr lang="en-US"/>
@@ -3477,37 +3500,9 @@
           <a:chExt cx="0" cy="0"/>
         </a:xfrm>
       </p:grpSpPr>
-      <p:sp>
-        <p:nvSpPr>
-          <p:cNvPr id="10" name="Title 9"/>
-          <p:cNvSpPr>
-            <a:spLocks noGrp="1"/>
-          </p:cNvSpPr>
-          <p:nvPr>
-            <p:ph type="title"/>
-          </p:nvPr>
-        </p:nvSpPr>
-        <p:spPr/>
-        <p:txBody>
-          <a:bodyPr/>
-          <a:lstStyle/>
-          <a:p>
-            <a:pPr algn="ctr"/>
-            <a:r>
-              <a:rPr lang="en-US" b="1" i="1" dirty="0" err="1" smtClean="0"/>
-              <a:t>VStar</a:t>
-            </a:r>
-            <a:r>
-              <a:rPr lang="en-US" i="1" dirty="0" smtClean="0"/>
-              <a:t> Begins</a:t>
-            </a:r>
-            <a:endParaRPr lang="en-US" b="1" i="1" dirty="0"/>
-          </a:p>
-        </p:txBody>
-      </p:sp>
       <p:pic>
         <p:nvPicPr>
-          <p:cNvPr id="11" name="Picture 10" descr="vstarites.jpg"/>
+          <p:cNvPr id="19" name="Picture 18" descr="DSCN1311.JPG"/>
           <p:cNvPicPr>
             <a:picLocks noChangeAspect="1"/>
           </p:cNvPicPr>
@@ -3521,14 +3516,42 @@
         </p:blipFill>
         <p:spPr>
           <a:xfrm>
-            <a:off x="5788152" y="4343400"/>
-            <a:ext cx="2898648" cy="2173986"/>
+            <a:off x="5105400" y="3810000"/>
+            <a:ext cx="3581400" cy="2686050"/>
           </a:xfrm>
           <a:prstGeom prst="rect">
             <a:avLst/>
           </a:prstGeom>
         </p:spPr>
       </p:pic>
+      <p:sp>
+        <p:nvSpPr>
+          <p:cNvPr id="10" name="Title 9"/>
+          <p:cNvSpPr>
+            <a:spLocks noGrp="1"/>
+          </p:cNvSpPr>
+          <p:nvPr>
+            <p:ph type="title"/>
+          </p:nvPr>
+        </p:nvSpPr>
+        <p:spPr/>
+        <p:txBody>
+          <a:bodyPr/>
+          <a:lstStyle/>
+          <a:p>
+            <a:pPr algn="ctr"/>
+            <a:r>
+              <a:rPr lang="en-US" b="1" i="1" dirty="0" err="1" smtClean="0"/>
+              <a:t>VStar</a:t>
+            </a:r>
+            <a:r>
+              <a:rPr lang="en-US" i="1" dirty="0" smtClean="0"/>
+              <a:t> Begins</a:t>
+            </a:r>
+            <a:endParaRPr lang="en-US" b="1" i="1" dirty="0"/>
+          </a:p>
+        </p:txBody>
+      </p:sp>
       <p:pic>
         <p:nvPicPr>
           <p:cNvPr id="14" name="Picture 13" descr="titleimage1.jpg"/>
@@ -3569,14 +3592,164 @@
         </p:blipFill>
         <p:spPr>
           <a:xfrm>
-            <a:off x="2057400" y="1125724"/>
-            <a:ext cx="4648200" cy="3217676"/>
+            <a:off x="152400" y="1125723"/>
+            <a:ext cx="4953000" cy="3428671"/>
           </a:xfrm>
           <a:prstGeom prst="rect">
             <a:avLst/>
           </a:prstGeom>
         </p:spPr>
       </p:pic>
+      <p:sp>
+        <p:nvSpPr>
+          <p:cNvPr id="7" name="TextBox 6"/>
+          <p:cNvSpPr txBox="1"/>
+          <p:nvPr/>
+        </p:nvSpPr>
+        <p:spPr>
+          <a:xfrm>
+            <a:off x="7315200" y="2530938"/>
+            <a:ext cx="817314" cy="646331"/>
+          </a:xfrm>
+          <a:prstGeom prst="rect">
+            <a:avLst/>
+          </a:prstGeom>
+          <a:noFill/>
+        </p:spPr>
+        <p:txBody>
+          <a:bodyPr wrap="none" rtlCol="0">
+            <a:spAutoFit/>
+          </a:bodyPr>
+          <a:lstStyle/>
+          <a:p>
+            <a:pPr algn="ctr"/>
+            <a:r>
+              <a:rPr lang="en-US" dirty="0" smtClean="0"/>
+              <a:t>David</a:t>
+            </a:r>
+          </a:p>
+          <a:p>
+            <a:pPr algn="ctr"/>
+            <a:r>
+              <a:rPr lang="en-US" dirty="0" smtClean="0"/>
+              <a:t>Benn</a:t>
+            </a:r>
+            <a:endParaRPr lang="en-US" dirty="0" smtClean="0"/>
+          </a:p>
+        </p:txBody>
+      </p:sp>
+      <p:cxnSp>
+        <p:nvCxnSpPr>
+          <p:cNvPr id="9" name="Straight Arrow Connector 8"/>
+          <p:cNvCxnSpPr>
+            <a:stCxn id="20" idx="2"/>
+          </p:cNvCxnSpPr>
+          <p:nvPr/>
+        </p:nvCxnSpPr>
+        <p:spPr>
+          <a:xfrm rot="16200000" flipH="1">
+            <a:off x="5649225" y="3591826"/>
+            <a:ext cx="1013735" cy="184619"/>
+          </a:xfrm>
+          <a:prstGeom prst="straightConnector1">
+            <a:avLst/>
+          </a:prstGeom>
+          <a:ln>
+            <a:tailEnd type="arrow"/>
+          </a:ln>
+        </p:spPr>
+        <p:style>
+          <a:lnRef idx="2">
+            <a:schemeClr val="accent1"/>
+          </a:lnRef>
+          <a:fillRef idx="0">
+            <a:schemeClr val="accent1"/>
+          </a:fillRef>
+          <a:effectRef idx="1">
+            <a:schemeClr val="accent1"/>
+          </a:effectRef>
+          <a:fontRef idx="minor">
+            <a:schemeClr val="tx1"/>
+          </a:fontRef>
+        </p:style>
+      </p:cxnSp>
+      <p:cxnSp>
+        <p:nvCxnSpPr>
+          <p:cNvPr id="13" name="Straight Arrow Connector 12"/>
+          <p:cNvCxnSpPr>
+            <a:stCxn id="7" idx="2"/>
+          </p:cNvCxnSpPr>
+          <p:nvPr/>
+        </p:nvCxnSpPr>
+        <p:spPr>
+          <a:xfrm rot="5400000">
+            <a:off x="7126963" y="3594107"/>
+            <a:ext cx="1013733" cy="180057"/>
+          </a:xfrm>
+          <a:prstGeom prst="straightConnector1">
+            <a:avLst/>
+          </a:prstGeom>
+          <a:ln>
+            <a:tailEnd type="arrow"/>
+          </a:ln>
+        </p:spPr>
+        <p:style>
+          <a:lnRef idx="2">
+            <a:schemeClr val="accent1"/>
+          </a:lnRef>
+          <a:fillRef idx="0">
+            <a:schemeClr val="accent1"/>
+          </a:fillRef>
+          <a:effectRef idx="1">
+            <a:schemeClr val="accent1"/>
+          </a:effectRef>
+          <a:fontRef idx="minor">
+            <a:schemeClr val="tx1"/>
+          </a:fontRef>
+        </p:style>
+      </p:cxnSp>
+      <p:sp>
+        <p:nvSpPr>
+          <p:cNvPr id="20" name="TextBox 19"/>
+          <p:cNvSpPr txBox="1"/>
+          <p:nvPr/>
+        </p:nvSpPr>
+        <p:spPr>
+          <a:xfrm>
+            <a:off x="5477725" y="2530938"/>
+            <a:ext cx="1172116" cy="646331"/>
+          </a:xfrm>
+          <a:prstGeom prst="rect">
+            <a:avLst/>
+          </a:prstGeom>
+          <a:noFill/>
+        </p:spPr>
+        <p:txBody>
+          <a:bodyPr wrap="none" rtlCol="0">
+            <a:spAutoFit/>
+          </a:bodyPr>
+          <a:lstStyle/>
+          <a:p>
+            <a:pPr algn="ctr"/>
+            <a:r>
+              <a:rPr lang="en-US" dirty="0" smtClean="0"/>
+              <a:t>Michael</a:t>
+            </a:r>
+            <a:endParaRPr lang="en-US" dirty="0" smtClean="0"/>
+          </a:p>
+          <a:p>
+            <a:pPr algn="ctr"/>
+            <a:r>
+              <a:rPr lang="en-US" dirty="0" err="1" smtClean="0"/>
+              <a:t>Umbricht</a:t>
+            </a:r>
+            <a:endParaRPr lang="en-US" dirty="0" smtClean="0"/>
+          </a:p>
+          <a:p>
+            <a:endParaRPr lang="en-US" dirty="0"/>
+          </a:p>
+        </p:txBody>
+      </p:sp>
     </p:spTree>
   </p:cSld>
   <p:clrMapOvr>
@@ -3625,91 +3798,103 @@
           <a:lstStyle/>
           <a:p>
             <a:r>
-              <a:rPr lang="en-US" dirty="0" smtClean="0"/>
-              <a:t>I am…	</a:t>
-            </a:r>
-            <a:endParaRPr lang="en-US" dirty="0"/>
-          </a:p>
-        </p:txBody>
-      </p:sp>
-      <p:sp>
-        <p:nvSpPr>
-          <p:cNvPr id="3" name="Content Placeholder 2"/>
-          <p:cNvSpPr>
-            <a:spLocks noGrp="1"/>
-          </p:cNvSpPr>
-          <p:nvPr>
-            <p:ph idx="1"/>
-          </p:nvPr>
-        </p:nvSpPr>
-        <p:spPr/>
-        <p:txBody>
-          <a:bodyPr/>
-          <a:lstStyle/>
-          <a:p>
-            <a:r>
-              <a:rPr lang="en-US" dirty="0" smtClean="0"/>
-              <a:t>an amateur/volunteer astronomer;</a:t>
-            </a:r>
-          </a:p>
-          <a:p>
-            <a:r>
-              <a:rPr lang="en-US" dirty="0" smtClean="0"/>
-              <a:t>a software engineer (aka Code Monkey) ;</a:t>
-            </a:r>
-          </a:p>
-          <a:p>
-            <a:r>
-              <a:rPr lang="en-US" dirty="0" smtClean="0"/>
-              <a:t>passionate about contributing to Science in my spare time;</a:t>
-            </a:r>
-          </a:p>
-          <a:p>
-            <a:r>
-              <a:rPr lang="en-US" dirty="0" smtClean="0"/>
-              <a:t>NOT a statistician or </a:t>
-            </a:r>
-            <a:r>
-              <a:rPr lang="en-US" dirty="0" smtClean="0"/>
-              <a:t>mathematician;</a:t>
-            </a:r>
-          </a:p>
-          <a:p>
-            <a:r>
-              <a:rPr lang="en-US" dirty="0" smtClean="0"/>
-              <a:t>k</a:t>
-            </a:r>
-            <a:r>
-              <a:rPr lang="en-US" dirty="0" smtClean="0"/>
-              <a:t>een to make </a:t>
-            </a:r>
-            <a:r>
               <a:rPr lang="en-US" dirty="0" err="1" smtClean="0"/>
               <a:t>VStar</a:t>
             </a:r>
             <a:r>
               <a:rPr lang="en-US" dirty="0" smtClean="0"/>
-              <a:t> what its intended </a:t>
+              <a:t> is…</a:t>
+            </a:r>
+            <a:endParaRPr lang="en-US" dirty="0"/>
+          </a:p>
+        </p:txBody>
+      </p:sp>
+      <p:sp>
+        <p:nvSpPr>
+          <p:cNvPr id="3" name="Content Placeholder 2"/>
+          <p:cNvSpPr>
+            <a:spLocks noGrp="1"/>
+          </p:cNvSpPr>
+          <p:nvPr>
+            <p:ph idx="1"/>
+          </p:nvPr>
+        </p:nvSpPr>
+        <p:spPr/>
+        <p:txBody>
+          <a:bodyPr>
+            <a:normAutofit/>
+          </a:bodyPr>
+          <a:lstStyle/>
+          <a:p>
+            <a:r>
+              <a:rPr lang="en-US" dirty="0" smtClean="0"/>
+              <a:t>intended to be an easy-to-use variable star data visualization and analysis tool;</a:t>
+            </a:r>
+          </a:p>
+          <a:p>
+            <a:r>
+              <a:rPr lang="en-US" dirty="0" smtClean="0"/>
+              <a:t>a </a:t>
             </a:r>
             <a:r>
               <a:rPr lang="en-US" dirty="0" err="1" smtClean="0"/>
-              <a:t>audience(s</a:t>
-            </a:r>
-            <a:r>
-              <a:rPr lang="en-US" dirty="0" smtClean="0"/>
-              <a:t>) want it to be.</a:t>
-            </a:r>
-          </a:p>
-          <a:p>
-            <a:pPr>
-              <a:buNone/>
-            </a:pPr>
+              <a:t>SourceForge</a:t>
+            </a:r>
+            <a:r>
+              <a:rPr lang="en-US" dirty="0" smtClean="0"/>
+              <a:t> project;</a:t>
+            </a:r>
+          </a:p>
+          <a:p>
+            <a:r>
+              <a:rPr lang="en-US" dirty="0" smtClean="0"/>
+              <a:t>still in progress;</a:t>
+            </a:r>
+          </a:p>
+          <a:p>
+            <a:r>
+              <a:rPr lang="en-US" dirty="0" smtClean="0"/>
+              <a:t>being implemented in multiple phases;</a:t>
+            </a:r>
+          </a:p>
+          <a:p>
+            <a:r>
+              <a:rPr lang="en-US" dirty="0" smtClean="0"/>
+              <a:t>in need of more testers (the more the merrier, especially with respect to platforms);</a:t>
+            </a:r>
             <a:endParaRPr lang="en-US" dirty="0" smtClean="0"/>
           </a:p>
           <a:p>
-            <a:pPr>
-              <a:buNone/>
-            </a:pPr>
+            <a:r>
+              <a:rPr lang="en-US" dirty="0" smtClean="0"/>
+              <a:t>no formal releases </a:t>
+            </a:r>
+            <a:r>
+              <a:rPr lang="en-US" dirty="0" smtClean="0"/>
+              <a:t>yet, but </a:t>
+            </a:r>
+            <a:r>
+              <a:rPr lang="en-US" dirty="0" err="1" smtClean="0"/>
+              <a:t>d</a:t>
+            </a:r>
+            <a:r>
+              <a:rPr lang="en-US" dirty="0" err="1" smtClean="0"/>
+              <a:t>ownloadble</a:t>
+            </a:r>
+            <a:r>
+              <a:rPr lang="en-US" dirty="0" smtClean="0"/>
+              <a:t> (</a:t>
+            </a:r>
+            <a:r>
+              <a:rPr lang="en-US" dirty="0" smtClean="0"/>
+              <a:t>please </a:t>
+            </a:r>
+            <a:r>
+              <a:rPr lang="en-US" dirty="0" smtClean="0"/>
+              <a:t>do; see Links slide).</a:t>
+            </a:r>
+          </a:p>
+          <a:p>
             <a:endParaRPr lang="en-US" dirty="0"/>
           </a:p>
         </p:txBody>
@@ -3762,12 +3947,8 @@
           <a:lstStyle/>
           <a:p>
             <a:r>
-              <a:rPr lang="en-US" dirty="0" err="1" smtClean="0"/>
-              <a:t>VStar</a:t>
-            </a:r>
-            <a:r>
-              <a:rPr lang="en-US" dirty="0" smtClean="0"/>
-              <a:t> is…</a:t>
+              <a:rPr lang="en-US" dirty="0" smtClean="0"/>
+              <a:t>Key Features</a:t>
             </a:r>
             <a:endParaRPr lang="en-US" dirty="0"/>
           </a:p>
@@ -3786,90 +3967,155 @@
         <p:spPr/>
         <p:txBody>
           <a:bodyPr>
-            <a:normAutofit/>
+            <a:normAutofit fontScale="92500" lnSpcReduction="20000"/>
           </a:bodyPr>
           <a:lstStyle/>
           <a:p>
             <a:r>
               <a:rPr lang="en-US" dirty="0" smtClean="0"/>
-              <a:t>intended </a:t>
-            </a:r>
-            <a:r>
-              <a:rPr lang="en-US" dirty="0" smtClean="0"/>
-              <a:t>to be an easy-to-use variable star data visualization</a:t>
-            </a:r>
-            <a:r>
-              <a:rPr lang="en-US" dirty="0" smtClean="0"/>
-              <a:t> and analysis tool;</a:t>
-            </a:r>
-          </a:p>
-          <a:p>
-            <a:r>
-              <a:rPr lang="en-US" dirty="0" smtClean="0"/>
-              <a:t>a </a:t>
-            </a:r>
-            <a:r>
-              <a:rPr lang="en-US" dirty="0" err="1" smtClean="0"/>
-              <a:t>SourceForge</a:t>
-            </a:r>
-            <a:r>
-              <a:rPr lang="en-US" dirty="0" smtClean="0"/>
-              <a:t> project;</a:t>
-            </a:r>
-          </a:p>
-          <a:p>
-            <a:r>
-              <a:rPr lang="en-US" dirty="0" smtClean="0"/>
-              <a:t>still in progress;</a:t>
-            </a:r>
-          </a:p>
-          <a:p>
-            <a:r>
-              <a:rPr lang="en-US" dirty="0" smtClean="0"/>
-              <a:t>being implemented in multiple phases;</a:t>
-            </a:r>
-          </a:p>
-          <a:p>
-            <a:r>
-              <a:rPr lang="en-US" dirty="0" smtClean="0"/>
-              <a:t>in need of more testers (the more the merrier, especially with respect to platforms);</a:t>
-            </a:r>
-          </a:p>
-          <a:p>
-            <a:r>
-              <a:rPr lang="en-US" dirty="0" err="1" smtClean="0"/>
-              <a:t>d</a:t>
-            </a:r>
-            <a:r>
-              <a:rPr lang="en-US" dirty="0" err="1" smtClean="0"/>
-              <a:t>ownloadble</a:t>
-            </a:r>
-            <a:r>
-              <a:rPr lang="en-US" dirty="0" smtClean="0"/>
-              <a:t> as a </a:t>
-            </a:r>
-            <a:r>
-              <a:rPr lang="en-US" dirty="0" err="1" smtClean="0"/>
-              <a:t>tarball</a:t>
+              <a:t>Now</a:t>
+            </a:r>
+          </a:p>
+          <a:p>
+            <a:pPr lvl="1"/>
+            <a:r>
+              <a:rPr lang="en-US" dirty="0" smtClean="0"/>
+              <a:t>Takes input from files and AAVSO database</a:t>
+            </a:r>
+            <a:endParaRPr lang="en-US" dirty="0" smtClean="0"/>
+          </a:p>
+          <a:p>
+            <a:pPr lvl="1"/>
+            <a:r>
+              <a:rPr lang="en-US" dirty="0" smtClean="0"/>
+              <a:t>Light curve with</a:t>
+            </a:r>
+            <a:r>
+              <a:rPr lang="en-US" dirty="0" smtClean="0"/>
+              <a:t> optional error </a:t>
+            </a:r>
+            <a:r>
+              <a:rPr lang="en-US" dirty="0" smtClean="0"/>
+              <a:t>bars</a:t>
+            </a:r>
+          </a:p>
+          <a:p>
+            <a:pPr lvl="1"/>
+            <a:r>
+              <a:rPr lang="en-US" dirty="0" smtClean="0"/>
+              <a:t>Mean </a:t>
+            </a:r>
+            <a:r>
+              <a:rPr lang="en-US" dirty="0" smtClean="0"/>
+              <a:t>plot plus light curve with</a:t>
+            </a:r>
+            <a:r>
+              <a:rPr lang="en-US" dirty="0" smtClean="0"/>
+              <a:t> optional error </a:t>
+            </a:r>
+            <a:r>
+              <a:rPr lang="en-US" dirty="0" smtClean="0"/>
+              <a:t>bars</a:t>
+            </a:r>
+          </a:p>
+          <a:p>
+            <a:pPr lvl="1"/>
+            <a:r>
+              <a:rPr lang="en-US" dirty="0" smtClean="0"/>
+              <a:t>Data related to each of these </a:t>
+            </a:r>
+            <a:r>
+              <a:rPr lang="en-US" dirty="0" smtClean="0"/>
+              <a:t>plots </a:t>
+            </a:r>
+            <a:r>
+              <a:rPr lang="en-US" dirty="0" smtClean="0"/>
+              <a:t>in tables</a:t>
+            </a:r>
+          </a:p>
+          <a:p>
+            <a:pPr lvl="1"/>
+            <a:r>
+              <a:rPr lang="en-US" dirty="0" smtClean="0"/>
+              <a:t>Series visibility change, with effect upon mean plot</a:t>
+            </a:r>
+          </a:p>
+          <a:p>
+            <a:pPr lvl="1"/>
+            <a:r>
+              <a:rPr lang="en-US" dirty="0" smtClean="0"/>
+              <a:t>Inspection of individual observations </a:t>
+            </a:r>
+          </a:p>
+          <a:p>
+            <a:pPr lvl="1"/>
+            <a:r>
+              <a:rPr lang="en-US" dirty="0" smtClean="0"/>
+              <a:t>Saving &amp; </a:t>
+            </a:r>
+            <a:r>
+              <a:rPr lang="en-US" dirty="0" smtClean="0"/>
+              <a:t>printing</a:t>
+            </a:r>
+          </a:p>
+          <a:p>
+            <a:pPr lvl="1"/>
+            <a:endParaRPr lang="en-US" dirty="0" smtClean="0"/>
+          </a:p>
+          <a:p>
+            <a:r>
+              <a:rPr lang="en-US" dirty="0" smtClean="0"/>
+              <a:t>Next</a:t>
+            </a:r>
+          </a:p>
+          <a:p>
+            <a:pPr lvl="1"/>
+            <a:r>
+              <a:rPr lang="en-US" dirty="0" smtClean="0"/>
+              <a:t>Phase </a:t>
+            </a:r>
+            <a:r>
+              <a:rPr lang="en-US" dirty="0" smtClean="0"/>
+              <a:t>plots</a:t>
+            </a:r>
+          </a:p>
+          <a:p>
+            <a:pPr lvl="1"/>
+            <a:r>
+              <a:rPr lang="en-US" dirty="0" smtClean="0"/>
+              <a:t>Period analysis algorithm </a:t>
+            </a:r>
+            <a:r>
+              <a:rPr lang="en-US" dirty="0" smtClean="0"/>
+              <a:t>implementation</a:t>
+            </a:r>
+          </a:p>
+          <a:p>
+            <a:pPr lvl="1"/>
+            <a:r>
+              <a:rPr lang="en-US" dirty="0" smtClean="0"/>
+              <a:t>Bug </a:t>
+            </a:r>
+            <a:r>
+              <a:rPr lang="en-US" dirty="0" smtClean="0"/>
+              <a:t>fixes</a:t>
+            </a:r>
+            <a:r>
+              <a:rPr lang="en-US" dirty="0" smtClean="0"/>
+              <a:t> based </a:t>
+            </a:r>
+            <a:r>
+              <a:rPr lang="en-US" dirty="0" smtClean="0"/>
+              <a:t>upon feedback so </a:t>
+            </a:r>
+            <a:r>
+              <a:rPr lang="en-US" dirty="0" smtClean="0"/>
+              <a:t>far</a:t>
             </a:r>
             <a:r>
               <a:rPr lang="en-US" dirty="0" smtClean="0"/>
               <a:t> </a:t>
             </a:r>
-            <a:r>
-              <a:rPr lang="en-US" dirty="0" smtClean="0"/>
-              <a:t>(</a:t>
-            </a:r>
-            <a:r>
-              <a:rPr lang="en-US" dirty="0" smtClean="0"/>
-              <a:t>please do)</a:t>
-            </a:r>
-            <a:r>
-              <a:rPr lang="en-US" dirty="0" smtClean="0"/>
-              <a:t>; but no formal releases yet.</a:t>
-            </a:r>
-          </a:p>
-          <a:p>
             <a:endParaRPr lang="en-US" dirty="0"/>
           </a:p>
         </p:txBody>
@@ -3923,7 +4169,7 @@
           <a:p>
             <a:r>
               <a:rPr lang="en-US" dirty="0" smtClean="0"/>
-              <a:t>Key Features</a:t>
+              <a:t>Who?</a:t>
             </a:r>
             <a:endParaRPr lang="en-US" dirty="0"/>
           </a:p>
@@ -3941,81 +4187,116 @@
         </p:nvSpPr>
         <p:spPr/>
         <p:txBody>
-          <a:bodyPr>
-            <a:normAutofit fontScale="92500"/>
-          </a:bodyPr>
-          <a:lstStyle/>
-          <a:p>
-            <a:r>
-              <a:rPr lang="en-US" dirty="0" smtClean="0"/>
-              <a:t>Now</a:t>
+          <a:bodyPr/>
+          <a:lstStyle/>
+          <a:p>
+            <a:r>
+              <a:rPr lang="en-US" dirty="0" smtClean="0"/>
+              <a:t>David Benn</a:t>
             </a:r>
           </a:p>
           <a:p>
             <a:pPr lvl="1"/>
             <a:r>
               <a:rPr lang="en-US" dirty="0" smtClean="0"/>
-              <a:t>Light curve with error bars</a:t>
-            </a:r>
+              <a:t>Development</a:t>
+            </a:r>
+          </a:p>
+          <a:p>
+            <a:r>
+              <a:rPr lang="en-US" dirty="0" smtClean="0"/>
+              <a:t>Michael </a:t>
+            </a:r>
+            <a:r>
+              <a:rPr lang="en-US" dirty="0" err="1" smtClean="0"/>
+              <a:t>Umbricht</a:t>
+            </a:r>
+            <a:endParaRPr lang="en-US" dirty="0" smtClean="0"/>
           </a:p>
           <a:p>
             <a:pPr lvl="1"/>
             <a:r>
               <a:rPr lang="en-US" dirty="0" smtClean="0"/>
-              <a:t>Mean plot plus light curve with error bars</a:t>
+              <a:t>Testing, encouragement, ideas</a:t>
+            </a:r>
+          </a:p>
+          <a:p>
+            <a:r>
+              <a:rPr lang="en-US" dirty="0" smtClean="0"/>
+              <a:t>AAVSO Staff</a:t>
             </a:r>
           </a:p>
           <a:p>
             <a:pPr lvl="1"/>
             <a:r>
               <a:rPr lang="en-US" dirty="0" smtClean="0"/>
-              <a:t>Data related to each of these plot in tables</a:t>
+              <a:t>Sara Beck, </a:t>
+            </a:r>
+            <a:r>
+              <a:rPr lang="en-US" dirty="0" smtClean="0"/>
+              <a:t>Arne </a:t>
+            </a:r>
+            <a:r>
+              <a:rPr lang="en-US" dirty="0" err="1" smtClean="0"/>
+              <a:t>Henden</a:t>
+            </a:r>
+            <a:r>
+              <a:rPr lang="en-US" dirty="0" smtClean="0"/>
+              <a:t>, Elizabeth </a:t>
+            </a:r>
+            <a:r>
+              <a:rPr lang="en-US" dirty="0" err="1" smtClean="0"/>
+              <a:t>Waagen</a:t>
+            </a:r>
+            <a:r>
+              <a:rPr lang="en-US" dirty="0" smtClean="0"/>
+              <a:t>, Aaron </a:t>
+            </a:r>
+            <a:r>
+              <a:rPr lang="en-US" dirty="0" smtClean="0"/>
+              <a:t>Price, Rebecca </a:t>
+            </a:r>
+            <a:r>
+              <a:rPr lang="en-US" dirty="0" smtClean="0"/>
+              <a:t>Turner, Matt Templeton</a:t>
+            </a:r>
+          </a:p>
+          <a:p>
+            <a:pPr lvl="2"/>
+            <a:r>
+              <a:rPr lang="en-US" dirty="0" smtClean="0"/>
+              <a:t>O</a:t>
+            </a:r>
+            <a:r>
+              <a:rPr lang="en-US" dirty="0" smtClean="0"/>
+              <a:t>versight, </a:t>
+            </a:r>
+            <a:r>
+              <a:rPr lang="en-US" dirty="0" err="1" smtClean="0"/>
+              <a:t>liason</a:t>
+            </a:r>
+            <a:r>
+              <a:rPr lang="en-US" dirty="0" smtClean="0"/>
+              <a:t>, analysis, testing, encouragement</a:t>
+            </a:r>
+          </a:p>
+          <a:p>
+            <a:r>
+              <a:rPr lang="en-US" dirty="0" smtClean="0"/>
+              <a:t>You?</a:t>
             </a:r>
           </a:p>
           <a:p>
             <a:pPr lvl="1"/>
             <a:r>
               <a:rPr lang="en-US" dirty="0" smtClean="0"/>
-              <a:t>Series visibility change, with effect upon mean plot</a:t>
-            </a:r>
-          </a:p>
-          <a:p>
-            <a:pPr lvl="1"/>
-            <a:r>
-              <a:rPr lang="en-US" dirty="0" smtClean="0"/>
-              <a:t>Inspection of individual observations </a:t>
-            </a:r>
-          </a:p>
-          <a:p>
-            <a:pPr lvl="1"/>
-            <a:r>
-              <a:rPr lang="en-US" dirty="0" smtClean="0"/>
-              <a:t>Saving, printing</a:t>
-            </a:r>
-          </a:p>
-          <a:p>
-            <a:pPr lvl="1"/>
-            <a:endParaRPr lang="en-US" dirty="0" smtClean="0"/>
-          </a:p>
-          <a:p>
-            <a:r>
-              <a:rPr lang="en-US" dirty="0" smtClean="0"/>
-              <a:t>Next</a:t>
-            </a:r>
-          </a:p>
-          <a:p>
-            <a:pPr lvl="1"/>
-            <a:r>
-              <a:rPr lang="en-US" dirty="0" smtClean="0"/>
-              <a:t>Phase plots</a:t>
-            </a:r>
-          </a:p>
-          <a:p>
-            <a:pPr lvl="1"/>
-            <a:r>
-              <a:rPr lang="en-US" dirty="0" smtClean="0"/>
-              <a:t>Period analysis algorithm implementations </a:t>
-            </a:r>
+              <a:t>We need more testers</a:t>
+            </a:r>
+          </a:p>
+          <a:p>
+            <a:pPr>
+              <a:buNone/>
+            </a:pPr>
             <a:endParaRPr lang="en-US" dirty="0"/>
           </a:p>
         </p:txBody>
@@ -4087,22 +4368,163 @@
         </p:nvSpPr>
         <p:spPr/>
         <p:txBody>
-          <a:bodyPr/>
-          <a:lstStyle/>
-          <a:p>
-            <a:r>
-              <a:rPr lang="en-US" dirty="0" smtClean="0"/>
-              <a:t>http://</a:t>
-            </a:r>
+          <a:bodyPr>
+            <a:normAutofit fontScale="92500"/>
+          </a:bodyPr>
+          <a:lstStyle/>
+          <a:p>
             <a:r>
               <a:rPr lang="en-US" dirty="0" err="1" smtClean="0"/>
-              <a:t>sourceforge.net/projects/vstar</a:t>
-            </a:r>
-            <a:r>
-              <a:rPr lang="en-US" dirty="0" smtClean="0"/>
+              <a:t>VStar</a:t>
+            </a:r>
+            <a:r>
+              <a:rPr lang="en-US" dirty="0" smtClean="0"/>
+              <a:t> </a:t>
+            </a:r>
+            <a:r>
+              <a:rPr lang="en-US" dirty="0" err="1" smtClean="0"/>
+              <a:t>SourceForge</a:t>
+            </a:r>
+            <a:r>
+              <a:rPr lang="en-US" dirty="0" smtClean="0"/>
+              <a:t> </a:t>
+            </a:r>
+            <a:r>
+              <a:rPr lang="en-US" dirty="0" smtClean="0"/>
+              <a:t>site</a:t>
+            </a:r>
+            <a:endParaRPr lang="en-US" dirty="0" smtClean="0">
+              <a:hlinkClick r:id="rId2"/>
+            </a:endParaRPr>
+          </a:p>
+          <a:p>
+            <a:pPr lvl="1"/>
+            <a:r>
+              <a:rPr lang="en-US" dirty="0" smtClean="0">
+                <a:hlinkClick r:id="rId2"/>
+              </a:rPr>
+              <a:t>http</a:t>
+            </a:r>
+            <a:r>
+              <a:rPr lang="en-US" dirty="0" smtClean="0">
+                <a:hlinkClick r:id="rId2"/>
+              </a:rPr>
+              <a:t>://sourceforge.net/projects/vstar</a:t>
+            </a:r>
+            <a:r>
+              <a:rPr lang="en-US" dirty="0" smtClean="0">
+                <a:hlinkClick r:id="rId2"/>
+              </a:rPr>
               <a:t>/</a:t>
             </a:r>
-            <a:endParaRPr lang="en-US" dirty="0"/>
+            <a:endParaRPr lang="en-US" dirty="0" smtClean="0"/>
+          </a:p>
+          <a:p>
+            <a:endParaRPr lang="en-US" dirty="0" smtClean="0"/>
+          </a:p>
+          <a:p>
+            <a:r>
+              <a:rPr lang="en-US" dirty="0" smtClean="0"/>
+              <a:t>Download latest </a:t>
+            </a:r>
+            <a:r>
+              <a:rPr lang="en-US" dirty="0" err="1" smtClean="0"/>
+              <a:t>Vstar</a:t>
+            </a:r>
+            <a:r>
+              <a:rPr lang="en-US" dirty="0" smtClean="0"/>
+              <a:t> archive (</a:t>
+            </a:r>
+            <a:r>
+              <a:rPr lang="en-US" dirty="0" err="1" smtClean="0"/>
+              <a:t>tarball</a:t>
+            </a:r>
+            <a:r>
+              <a:rPr lang="en-US" dirty="0" smtClean="0"/>
+              <a:t>)</a:t>
+            </a:r>
+          </a:p>
+          <a:p>
+            <a:pPr lvl="1"/>
+            <a:r>
+              <a:rPr lang="en-US" dirty="0" smtClean="0">
+                <a:hlinkClick r:id="rId3"/>
+              </a:rPr>
+              <a:t>http://vstar.svn.sourceforge.net/viewvc/vstar/trunk</a:t>
+            </a:r>
+            <a:r>
+              <a:rPr lang="en-US" dirty="0" smtClean="0">
+                <a:hlinkClick r:id="rId3"/>
+              </a:rPr>
+              <a:t>/</a:t>
+            </a:r>
+            <a:endParaRPr lang="en-US" dirty="0" smtClean="0"/>
+          </a:p>
+          <a:p>
+            <a:pPr lvl="1"/>
+            <a:r>
+              <a:rPr lang="en-US" dirty="0" smtClean="0"/>
+              <a:t>Click “Download GNU </a:t>
+            </a:r>
+            <a:r>
+              <a:rPr lang="en-US" dirty="0" err="1" smtClean="0"/>
+              <a:t>tarball</a:t>
+            </a:r>
+            <a:r>
+              <a:rPr lang="en-US" dirty="0" smtClean="0"/>
+              <a:t>”</a:t>
+            </a:r>
+          </a:p>
+          <a:p>
+            <a:pPr lvl="1"/>
+            <a:r>
+              <a:rPr lang="en-US" dirty="0" smtClean="0"/>
+              <a:t>See </a:t>
+            </a:r>
+            <a:r>
+              <a:rPr lang="en-US" dirty="0" err="1" smtClean="0"/>
+              <a:t>ReadMe.txt</a:t>
+            </a:r>
+            <a:r>
+              <a:rPr lang="en-US" dirty="0" smtClean="0"/>
+              <a:t> in top-level directory</a:t>
+            </a:r>
+          </a:p>
+          <a:p>
+            <a:pPr lvl="1"/>
+            <a:endParaRPr lang="en-US" dirty="0" smtClean="0"/>
+          </a:p>
+          <a:p>
+            <a:r>
+              <a:rPr lang="en-US" dirty="0" smtClean="0"/>
+              <a:t>Download latest </a:t>
+            </a:r>
+            <a:r>
+              <a:rPr lang="en-US" dirty="0" err="1" smtClean="0"/>
+              <a:t>VStar</a:t>
+            </a:r>
+            <a:r>
+              <a:rPr lang="en-US" dirty="0" smtClean="0"/>
+              <a:t> via Subversion </a:t>
+            </a:r>
+          </a:p>
+          <a:p>
+            <a:pPr lvl="1"/>
+            <a:r>
+              <a:rPr lang="en-US" dirty="0" smtClean="0">
+                <a:hlinkClick r:id="rId2"/>
+              </a:rPr>
+              <a:t>svn co https://vstar.svn.sourceforge.net/svnroot/vstar/trunk vstar</a:t>
+            </a:r>
+            <a:endParaRPr lang="en-US" dirty="0" smtClean="0">
+              <a:hlinkClick r:id="rId2"/>
+            </a:endParaRPr>
+          </a:p>
+          <a:p>
+            <a:pPr>
+              <a:buNone/>
+            </a:pPr>
+            <a:endParaRPr lang="en-US" dirty="0" smtClean="0"/>
           </a:p>
         </p:txBody>
       </p:sp>

</xml_diff>